<commit_message>
Section 2 presentation update
</commit_message>
<xml_diff>
--- a/section2/section2.pptx
+++ b/section2/section2.pptx
@@ -112,6 +112,11 @@
       </a:defRPr>
     </a:lvl9pPr>
   </p:defaultTextStyle>
+  <p:extLst>
+    <p:ext uri="{EFAFB233-063F-42B5-8137-9DF3F51BA10A}">
+      <p15:sldGuideLst xmlns:p15="http://schemas.microsoft.com/office/powerpoint/2012/main"/>
+    </p:ext>
+  </p:extLst>
 </p:presentation>
 </file>
 
@@ -197,7 +202,7 @@
           <a:p>
             <a:fld id="{5549AB31-C21E-4C3B-B1A0-0CB868F832B2}" type="datetimeFigureOut">
               <a:rPr lang="en-US" smtClean="0"/>
-              <a:t>2025-10-25</a:t>
+              <a:t>2025-10-28</a:t>
             </a:fld>
             <a:endParaRPr lang="en-US"/>
           </a:p>
@@ -1135,7 +1140,7 @@
           <a:p>
             <a:fld id="{3365F9F5-D4B5-4EB9-A01F-29DBFF511CA8}" type="datetimeFigureOut">
               <a:rPr lang="en-US" smtClean="0"/>
-              <a:t>2025-10-25</a:t>
+              <a:t>2025-10-28</a:t>
             </a:fld>
             <a:endParaRPr lang="en-US"/>
           </a:p>
@@ -1333,7 +1338,7 @@
           <a:p>
             <a:fld id="{3365F9F5-D4B5-4EB9-A01F-29DBFF511CA8}" type="datetimeFigureOut">
               <a:rPr lang="en-US" smtClean="0"/>
-              <a:t>2025-10-25</a:t>
+              <a:t>2025-10-28</a:t>
             </a:fld>
             <a:endParaRPr lang="en-US"/>
           </a:p>
@@ -1541,7 +1546,7 @@
           <a:p>
             <a:fld id="{3365F9F5-D4B5-4EB9-A01F-29DBFF511CA8}" type="datetimeFigureOut">
               <a:rPr lang="en-US" smtClean="0"/>
-              <a:t>2025-10-25</a:t>
+              <a:t>2025-10-28</a:t>
             </a:fld>
             <a:endParaRPr lang="en-US"/>
           </a:p>
@@ -1739,7 +1744,7 @@
           <a:p>
             <a:fld id="{3365F9F5-D4B5-4EB9-A01F-29DBFF511CA8}" type="datetimeFigureOut">
               <a:rPr lang="en-US" smtClean="0"/>
-              <a:t>2025-10-25</a:t>
+              <a:t>2025-10-28</a:t>
             </a:fld>
             <a:endParaRPr lang="en-US"/>
           </a:p>
@@ -2014,7 +2019,7 @@
           <a:p>
             <a:fld id="{3365F9F5-D4B5-4EB9-A01F-29DBFF511CA8}" type="datetimeFigureOut">
               <a:rPr lang="en-US" smtClean="0"/>
-              <a:t>2025-10-25</a:t>
+              <a:t>2025-10-28</a:t>
             </a:fld>
             <a:endParaRPr lang="en-US"/>
           </a:p>
@@ -2279,7 +2284,7 @@
           <a:p>
             <a:fld id="{3365F9F5-D4B5-4EB9-A01F-29DBFF511CA8}" type="datetimeFigureOut">
               <a:rPr lang="en-US" smtClean="0"/>
-              <a:t>2025-10-25</a:t>
+              <a:t>2025-10-28</a:t>
             </a:fld>
             <a:endParaRPr lang="en-US"/>
           </a:p>
@@ -2691,7 +2696,7 @@
           <a:p>
             <a:fld id="{3365F9F5-D4B5-4EB9-A01F-29DBFF511CA8}" type="datetimeFigureOut">
               <a:rPr lang="en-US" smtClean="0"/>
-              <a:t>2025-10-25</a:t>
+              <a:t>2025-10-28</a:t>
             </a:fld>
             <a:endParaRPr lang="en-US"/>
           </a:p>
@@ -2832,7 +2837,7 @@
           <a:p>
             <a:fld id="{3365F9F5-D4B5-4EB9-A01F-29DBFF511CA8}" type="datetimeFigureOut">
               <a:rPr lang="en-US" smtClean="0"/>
-              <a:t>2025-10-25</a:t>
+              <a:t>2025-10-28</a:t>
             </a:fld>
             <a:endParaRPr lang="en-US"/>
           </a:p>
@@ -2945,7 +2950,7 @@
           <a:p>
             <a:fld id="{3365F9F5-D4B5-4EB9-A01F-29DBFF511CA8}" type="datetimeFigureOut">
               <a:rPr lang="en-US" smtClean="0"/>
-              <a:t>2025-10-25</a:t>
+              <a:t>2025-10-28</a:t>
             </a:fld>
             <a:endParaRPr lang="en-US"/>
           </a:p>
@@ -3256,7 +3261,7 @@
           <a:p>
             <a:fld id="{3365F9F5-D4B5-4EB9-A01F-29DBFF511CA8}" type="datetimeFigureOut">
               <a:rPr lang="en-US" smtClean="0"/>
-              <a:t>2025-10-25</a:t>
+              <a:t>2025-10-28</a:t>
             </a:fld>
             <a:endParaRPr lang="en-US"/>
           </a:p>
@@ -3544,7 +3549,7 @@
           <a:p>
             <a:fld id="{3365F9F5-D4B5-4EB9-A01F-29DBFF511CA8}" type="datetimeFigureOut">
               <a:rPr lang="en-US" smtClean="0"/>
-              <a:t>2025-10-25</a:t>
+              <a:t>2025-10-28</a:t>
             </a:fld>
             <a:endParaRPr lang="en-US"/>
           </a:p>
@@ -3785,7 +3790,7 @@
           <a:p>
             <a:fld id="{3365F9F5-D4B5-4EB9-A01F-29DBFF511CA8}" type="datetimeFigureOut">
               <a:rPr lang="en-US" smtClean="0"/>
-              <a:t>2025-10-25</a:t>
+              <a:t>2025-10-28</a:t>
             </a:fld>
             <a:endParaRPr lang="en-US"/>
           </a:p>
@@ -4622,7 +4627,7 @@
         </p:nvSpPr>
         <p:spPr>
           <a:xfrm>
-            <a:off x="532151" y="1326629"/>
+            <a:off x="7555041" y="1349114"/>
             <a:ext cx="4384623" cy="5284034"/>
           </a:xfrm>
         </p:spPr>
@@ -4631,20 +4636,6 @@
             <a:normAutofit fontScale="62500" lnSpcReduction="20000"/>
           </a:bodyPr>
           <a:lstStyle/>
-          <a:p>
-            <a:pPr marL="0" indent="0">
-              <a:lnSpc>
-                <a:spcPct val="110000"/>
-              </a:lnSpc>
-              <a:buNone/>
-            </a:pPr>
-            <a:r>
-              <a:rPr lang="en-US" dirty="0">
-                <a:latin typeface="Abadi" panose="020B0604020104020204" pitchFamily="34" charset="0"/>
-              </a:rPr>
-              <a:t>The three steps are:</a:t>
-            </a:r>
-          </a:p>
           <a:p>
             <a:pPr marL="274320">
               <a:lnSpc>
@@ -4801,7 +4792,7 @@
         </p:blipFill>
         <p:spPr>
           <a:xfrm>
-            <a:off x="5118524" y="1326948"/>
+            <a:off x="532149" y="1349114"/>
             <a:ext cx="6900052" cy="3972394"/>
           </a:xfrm>
           <a:prstGeom prst="rect">
@@ -4823,7 +4814,7 @@
         </p:nvSpPr>
         <p:spPr>
           <a:xfrm>
-            <a:off x="10826711" y="5273587"/>
+            <a:off x="6240336" y="5433934"/>
             <a:ext cx="1191865" cy="276999"/>
           </a:xfrm>
           <a:prstGeom prst="rect">

</xml_diff>